<commit_message>
edit slide for more detials
</commit_message>
<xml_diff>
--- a/presentations/DevDay2019_Java_intro.pptx
+++ b/presentations/DevDay2019_Java_intro.pptx
@@ -252,7 +252,7 @@
           <a:p>
             <a:fld id="{D426F103-508E-467C-AF53-B35FDC2F36C0}" type="datetimeFigureOut">
               <a:rPr lang="en-US" smtClean="0"/>
-              <a:t>04-Nov-2019</a:t>
+              <a:t>05-Nov-2019</a:t>
             </a:fld>
             <a:endParaRPr lang="en-US"/>
           </a:p>
@@ -429,7 +429,7 @@
           <a:p>
             <a:fld id="{A90D6CB4-478E-4505-A839-A5849C2F988C}" type="datetimeFigureOut">
               <a:rPr lang="en-US" smtClean="0"/>
-              <a:t>04-Nov-2019</a:t>
+              <a:t>05-Nov-2019</a:t>
             </a:fld>
             <a:endParaRPr lang="en-US"/>
           </a:p>
@@ -1052,6 +1052,14 @@
           <a:bodyPr/>
           <a:lstStyle/>
           <a:p>
+            <a:r>
+              <a:rPr lang="en-US" dirty="0" smtClean="0"/>
+              <a:t>How &amp; who will check your</a:t>
+            </a:r>
+            <a:r>
+              <a:rPr lang="en-US" baseline="0" dirty="0" smtClean="0"/>
+              <a:t> exercise: your supporters</a:t>
+            </a:r>
             <a:endParaRPr lang="en-US" dirty="0"/>
           </a:p>
         </p:txBody>
@@ -1142,11 +1150,7 @@
             </a:r>
             <a:r>
               <a:rPr lang="en-US" baseline="0" dirty="0" smtClean="0"/>
-              <a:t> for audience </a:t>
-            </a:r>
-            <a:r>
-              <a:rPr lang="en-US" baseline="0" dirty="0" smtClean="0"/>
-              <a:t>satisfaction</a:t>
+              <a:t> for audience satisfaction</a:t>
             </a:r>
           </a:p>
           <a:p>
@@ -2788,7 +2792,7 @@
         </p:blipFill>
         <p:spPr>
           <a:xfrm>
-            <a:off x="8959662" y="3147219"/>
+            <a:off x="9448800" y="2971800"/>
             <a:ext cx="2743200" cy="2606040"/>
           </a:xfrm>
           <a:prstGeom prst="rect">
@@ -3048,13 +3052,8 @@
             </a:pPr>
             <a:r>
               <a:rPr lang="en-US" sz="2400" dirty="0" smtClean="0"/>
-              <a:t>Reduce boilerplate </a:t>
-            </a:r>
-            <a:r>
-              <a:rPr lang="en-US" sz="2400" dirty="0" smtClean="0"/>
-              <a:t>code</a:t>
-            </a:r>
-            <a:endParaRPr lang="en-US" sz="2400" dirty="0" smtClean="0"/>
+              <a:t>Reduce boilerplate code</a:t>
+            </a:r>
           </a:p>
           <a:p>
             <a:endParaRPr lang="en-US" sz="2400" dirty="0"/>
@@ -3181,7 +3180,12 @@
             <p:ph sz="quarter" idx="10"/>
           </p:nvPr>
         </p:nvSpPr>
-        <p:spPr/>
+        <p:spPr>
+          <a:xfrm>
+            <a:off x="838200" y="457200"/>
+            <a:ext cx="10515600" cy="1139825"/>
+          </a:xfrm>
+        </p:spPr>
         <p:txBody>
           <a:bodyPr/>
           <a:lstStyle/>
@@ -3202,25 +3206,35 @@
           </a:p>
         </p:txBody>
       </p:sp>
-      <p:sp>
-        <p:nvSpPr>
-          <p:cNvPr id="3" name="Text Placeholder 2"/>
-          <p:cNvSpPr>
-            <a:spLocks noGrp="1"/>
-          </p:cNvSpPr>
-          <p:nvPr>
-            <p:ph type="body" sz="quarter" idx="11"/>
-          </p:nvPr>
-        </p:nvSpPr>
-        <p:spPr/>
-        <p:txBody>
-          <a:bodyPr/>
-          <a:lstStyle/>
-          <a:p>
-            <a:endParaRPr lang="en-US" dirty="0" smtClean="0"/>
-          </a:p>
-        </p:txBody>
-      </p:sp>
+      <p:pic>
+        <p:nvPicPr>
+          <p:cNvPr id="11" name="Picture 10"/>
+          <p:cNvPicPr>
+            <a:picLocks noChangeAspect="1"/>
+          </p:cNvPicPr>
+          <p:nvPr/>
+        </p:nvPicPr>
+        <p:blipFill rotWithShape="1">
+          <a:blip r:embed="rId4">
+            <a:extLst>
+              <a:ext uri="{28A0092B-C50C-407E-A947-70E740481C1C}">
+                <a14:useLocalDpi xmlns:a14="http://schemas.microsoft.com/office/drawing/2010/main" val="0"/>
+              </a:ext>
+            </a:extLst>
+          </a:blip>
+          <a:srcRect t="37017" b="4700"/>
+          <a:stretch/>
+        </p:blipFill>
+        <p:spPr>
+          <a:xfrm>
+            <a:off x="0" y="1981200"/>
+            <a:ext cx="12192000" cy="4724400"/>
+          </a:xfrm>
+          <a:prstGeom prst="rect">
+            <a:avLst/>
+          </a:prstGeom>
+        </p:spPr>
+      </p:pic>
     </p:spTree>
     <p:extLst>
       <p:ext uri="{BB962C8B-B14F-4D97-AF65-F5344CB8AC3E}">
@@ -3273,15 +3287,7 @@
           <a:p>
             <a:r>
               <a:rPr lang="en-US" dirty="0" smtClean="0"/>
-              <a:t>How </a:t>
-            </a:r>
-            <a:r>
-              <a:rPr lang="en-US" dirty="0" smtClean="0"/>
-              <a:t>many exercises</a:t>
-            </a:r>
-            <a:r>
-              <a:rPr lang="en-US" dirty="0" smtClean="0"/>
-              <a:t>?</a:t>
+              <a:t>How many exercises?</a:t>
             </a:r>
             <a:endParaRPr lang="en-US" dirty="0"/>
           </a:p>
@@ -3299,7 +3305,7 @@
         </p:nvSpPr>
         <p:spPr>
           <a:xfrm>
-            <a:off x="929640" y="2590801"/>
+            <a:off x="864767" y="2636759"/>
             <a:ext cx="10515600" cy="2590800"/>
           </a:xfrm>
         </p:spPr>
@@ -3558,8 +3564,8 @@
         </p:nvSpPr>
         <p:spPr>
           <a:xfrm>
-            <a:off x="891540" y="985361"/>
-            <a:ext cx="10515600" cy="1146175"/>
+            <a:off x="891540" y="985362"/>
+            <a:ext cx="10515600" cy="995840"/>
           </a:xfrm>
           <a:prstGeom prst="rect">
             <a:avLst/>
@@ -3945,10 +3951,64 @@
           </a:lstStyle>
           <a:p>
             <a:r>
-              <a:rPr lang="en-US" smtClean="0"/>
-              <a:t>How many exercises we have to finish?</a:t>
+              <a:rPr lang="en-US" dirty="0" smtClean="0"/>
+              <a:t>How many exercises </a:t>
+            </a:r>
+            <a:r>
+              <a:rPr lang="en-US" dirty="0" smtClean="0"/>
+              <a:t>have </a:t>
+            </a:r>
+            <a:r>
+              <a:rPr lang="en-US" dirty="0" smtClean="0"/>
+              <a:t>to </a:t>
+            </a:r>
+            <a:r>
+              <a:rPr lang="en-US" dirty="0" smtClean="0"/>
+              <a:t>be finished?</a:t>
             </a:r>
             <a:endParaRPr lang="en-US" dirty="0"/>
+          </a:p>
+        </p:txBody>
+      </p:sp>
+      <p:sp>
+        <p:nvSpPr>
+          <p:cNvPr id="7" name="Rectangle 6"/>
+          <p:cNvSpPr/>
+          <p:nvPr/>
+        </p:nvSpPr>
+        <p:spPr>
+          <a:xfrm>
+            <a:off x="864767" y="6137910"/>
+            <a:ext cx="6629400" cy="369332"/>
+          </a:xfrm>
+          <a:prstGeom prst="rect">
+            <a:avLst/>
+          </a:prstGeom>
+        </p:spPr>
+        <p:txBody>
+          <a:bodyPr wrap="square">
+            <a:spAutoFit/>
+          </a:bodyPr>
+          <a:lstStyle/>
+          <a:p>
+            <a:pPr marL="228600" indent="-228600">
+              <a:lnSpc>
+                <a:spcPct val="90000"/>
+              </a:lnSpc>
+              <a:spcBef>
+                <a:spcPts val="1000"/>
+              </a:spcBef>
+              <a:buClr>
+                <a:schemeClr val="accent1"/>
+              </a:buClr>
+              <a:buFont typeface="Arial" panose="020B0604020202020204" pitchFamily="34" charset="0"/>
+              <a:buChar char="•"/>
+            </a:pPr>
+            <a:r>
+              <a:rPr lang="en-US" sz="2000" dirty="0"/>
+              <a:t>Your team decision</a:t>
+            </a:r>
+            <a:endParaRPr lang="en-US" sz="2000" dirty="0"/>
           </a:p>
         </p:txBody>
       </p:sp>
@@ -4122,11 +4182,11 @@
   <p:clrMapOvr>
     <a:masterClrMapping/>
   </p:clrMapOvr>
-  <mc:AlternateContent xmlns:mc="http://schemas.openxmlformats.org/markup-compatibility/2006">
-    <mc:Choice xmlns:p14="http://schemas.microsoft.com/office/powerpoint/2010/main" Requires="p14">
+  <mc:AlternateContent xmlns:mc="http://schemas.openxmlformats.org/markup-compatibility/2006" xmlns:p14="http://schemas.microsoft.com/office/powerpoint/2010/main">
+    <mc:Choice Requires="p14">
       <p:transition spd="slow" p14:dur="2000"/>
     </mc:Choice>
-    <mc:Fallback>
+    <mc:Fallback xmlns="">
       <p:transition spd="slow"/>
     </mc:Fallback>
   </mc:AlternateContent>

</xml_diff>